<commit_message>
UPdated slides for module05
</commit_message>
<xml_diff>
--- a/results/5507-05-simon-slides-and-speaker-notes.pptx
+++ b/results/5507-05-simon-slides-and-speaker-notes.pptx
@@ -778,1640 +778,6 @@
               <a:t>module05.</a:t>
             </a:r>
           </a:p>
-          <a:p>
-            <a:pPr lvl="0" marL="0" indent="0">
-              <a:buNone/>
-            </a:pPr>
-          </a:p>
-          <a:p>
-            <a:pPr lvl="0" marL="0" indent="0">
-              <a:buNone/>
-            </a:pPr>
-            <a:r>
-              <a:rPr/>
-              <a:t>[For</a:t>
-            </a:r>
-            <a:r>
-              <a:rPr/>
-              <a:t> </a:t>
-            </a:r>
-            <a:r>
-              <a:rPr/>
-              <a:t>my</a:t>
-            </a:r>
-            <a:r>
-              <a:rPr/>
-              <a:t> </a:t>
-            </a:r>
-            <a:r>
-              <a:rPr/>
-              <a:t>own</a:t>
-            </a:r>
-            <a:r>
-              <a:rPr/>
-              <a:t> </a:t>
-            </a:r>
-            <a:r>
-              <a:rPr/>
-              <a:t>use]General</a:t>
-            </a:r>
-            <a:r>
-              <a:rPr/>
-              <a:t> </a:t>
-            </a:r>
-            <a:r>
-              <a:rPr/>
-              <a:t>structure</a:t>
-            </a:r>
-            <a:r>
-              <a:rPr/>
-              <a:t> </a:t>
-            </a:r>
-            <a:r>
-              <a:rPr/>
-              <a:t>of</a:t>
-            </a:r>
-            <a:r>
-              <a:rPr/>
-              <a:t> </a:t>
-            </a:r>
-            <a:r>
-              <a:rPr/>
-              <a:t>this</a:t>
-            </a:r>
-            <a:r>
-              <a:rPr/>
-              <a:t> </a:t>
-            </a:r>
-            <a:r>
-              <a:rPr/>
-              <a:t>program.</a:t>
-            </a:r>
-          </a:p>
-          <a:p>
-            <a:pPr lvl="0" marL="0" indent="0">
-              <a:buNone/>
-            </a:pPr>
-          </a:p>
-          <a:p>
-            <a:pPr lvl="1"/>
-            <a:r>
-              <a:rPr/>
-              <a:t>Part00.</a:t>
-            </a:r>
-            <a:r>
-              <a:rPr/>
-              <a:t> </a:t>
-            </a:r>
-            <a:r>
-              <a:rPr/>
-              <a:t>Documentation</a:t>
-            </a:r>
-            <a:r>
-              <a:rPr/>
-              <a:t> </a:t>
-            </a:r>
-            <a:r>
-              <a:rPr/>
-              <a:t>header</a:t>
-            </a:r>
-          </a:p>
-          <a:p>
-            <a:pPr lvl="0" marL="0" indent="0">
-              <a:buNone/>
-            </a:pPr>
-          </a:p>
-          <a:p>
-            <a:pPr lvl="1"/>
-            <a:r>
-              <a:rPr/>
-              <a:t>Notes00</a:t>
-            </a:r>
-            <a:r>
-              <a:rPr/>
-              <a:t> </a:t>
-            </a:r>
-            <a:r>
-              <a:rPr/>
-              <a:t>This</a:t>
-            </a:r>
-            <a:r>
-              <a:rPr/>
-              <a:t> </a:t>
-            </a:r>
-            <a:r>
-              <a:rPr/>
-              <a:t>is</a:t>
-            </a:r>
-            <a:r>
-              <a:rPr/>
-              <a:t> </a:t>
-            </a:r>
-            <a:r>
-              <a:rPr/>
-              <a:t>the</a:t>
-            </a:r>
-            <a:r>
-              <a:rPr/>
-              <a:t> </a:t>
-            </a:r>
-            <a:r>
-              <a:rPr/>
-              <a:t>standard</a:t>
-            </a:r>
-            <a:r>
-              <a:rPr/>
-              <a:t> </a:t>
-            </a:r>
-            <a:r>
-              <a:rPr/>
-              <a:t>documentation</a:t>
-            </a:r>
-            <a:r>
-              <a:rPr/>
-              <a:t> </a:t>
-            </a:r>
-            <a:r>
-              <a:rPr/>
-              <a:t>header.;</a:t>
-            </a:r>
-          </a:p>
-          <a:p>
-            <a:pPr lvl="0" marL="0" indent="0">
-              <a:buNone/>
-            </a:pPr>
-          </a:p>
-          <a:p>
-            <a:pPr lvl="1"/>
-            <a:r>
-              <a:rPr/>
-              <a:t>Part01.</a:t>
-            </a:r>
-            <a:r>
-              <a:rPr/>
-              <a:t> </a:t>
-            </a:r>
-            <a:r>
-              <a:rPr/>
-              <a:t>Tell</a:t>
-            </a:r>
-            <a:r>
-              <a:rPr/>
-              <a:t> </a:t>
-            </a:r>
-            <a:r>
-              <a:rPr/>
-              <a:t>SAS</a:t>
-            </a:r>
-            <a:r>
-              <a:rPr/>
-              <a:t> </a:t>
-            </a:r>
-            <a:r>
-              <a:rPr/>
-              <a:t>where</a:t>
-            </a:r>
-            <a:r>
-              <a:rPr/>
-              <a:t> </a:t>
-            </a:r>
-            <a:r>
-              <a:rPr/>
-              <a:t>to</a:t>
-            </a:r>
-            <a:r>
-              <a:rPr/>
-              <a:t> </a:t>
-            </a:r>
-            <a:r>
-              <a:rPr/>
-              <a:t>find</a:t>
-            </a:r>
-            <a:r>
-              <a:rPr/>
-              <a:t> </a:t>
-            </a:r>
-            <a:r>
-              <a:rPr/>
-              <a:t>and</a:t>
-            </a:r>
-            <a:r>
-              <a:rPr/>
-              <a:t> </a:t>
-            </a:r>
-            <a:r>
-              <a:rPr/>
-              <a:t>store</a:t>
-            </a:r>
-            <a:r>
-              <a:rPr/>
-              <a:t> </a:t>
-            </a:r>
-            <a:r>
-              <a:rPr/>
-              <a:t>things.;</a:t>
-            </a:r>
-          </a:p>
-          <a:p>
-            <a:pPr lvl="0" marL="0" indent="0">
-              <a:buNone/>
-            </a:pPr>
-          </a:p>
-          <a:p>
-            <a:pPr lvl="1"/>
-            <a:r>
-              <a:rPr/>
-              <a:t>This</a:t>
-            </a:r>
-            <a:r>
-              <a:rPr/>
-              <a:t> </a:t>
-            </a:r>
-            <a:r>
-              <a:rPr/>
-              <a:t>needed</a:t>
-            </a:r>
-            <a:r>
-              <a:rPr/>
-              <a:t> </a:t>
-            </a:r>
-            <a:r>
-              <a:rPr/>
-              <a:t>to</a:t>
-            </a:r>
-            <a:r>
-              <a:rPr/>
-              <a:t> </a:t>
-            </a:r>
-            <a:r>
-              <a:rPr/>
-              <a:t>have</a:t>
-            </a:r>
-            <a:r>
-              <a:rPr/>
-              <a:t> </a:t>
-            </a:r>
-            <a:r>
-              <a:rPr/>
-              <a:t>the</a:t>
-            </a:r>
-            <a:r>
-              <a:rPr/>
-              <a:t> </a:t>
-            </a:r>
-            <a:r>
-              <a:rPr/>
-              <a:t>output</a:t>
-            </a:r>
-            <a:r>
-              <a:rPr/>
-              <a:t> </a:t>
-            </a:r>
-            <a:r>
-              <a:rPr/>
-              <a:t>fit</a:t>
-            </a:r>
-            <a:r>
-              <a:rPr/>
-              <a:t> </a:t>
-            </a:r>
-            <a:r>
-              <a:rPr/>
-              <a:t>on</a:t>
-            </a:r>
-            <a:r>
-              <a:rPr/>
-              <a:t> </a:t>
-            </a:r>
-            <a:r>
-              <a:rPr/>
-              <a:t>PowerPoint;</a:t>
-            </a:r>
-          </a:p>
-          <a:p>
-            <a:pPr lvl="0" marL="0" indent="0">
-              <a:buNone/>
-            </a:pPr>
-          </a:p>
-          <a:p>
-            <a:pPr lvl="1"/>
-            <a:r>
-              <a:rPr/>
-              <a:t>Notes01.</a:t>
-            </a:r>
-            <a:r>
-              <a:rPr/>
-              <a:t> </a:t>
-            </a:r>
-            <a:r>
-              <a:rPr/>
-              <a:t>You</a:t>
-            </a:r>
-            <a:r>
-              <a:rPr/>
-              <a:t> </a:t>
-            </a:r>
-            <a:r>
-              <a:rPr/>
-              <a:t>should</a:t>
-            </a:r>
-            <a:r>
-              <a:rPr/>
-              <a:t> </a:t>
-            </a:r>
-            <a:r>
-              <a:rPr/>
-              <a:t>already</a:t>
-            </a:r>
-            <a:r>
-              <a:rPr/>
-              <a:t> </a:t>
-            </a:r>
-            <a:r>
-              <a:rPr/>
-              <a:t>be</a:t>
-            </a:r>
-            <a:r>
-              <a:rPr/>
-              <a:t> </a:t>
-            </a:r>
-            <a:r>
-              <a:rPr/>
-              <a:t>familiar</a:t>
-            </a:r>
-            <a:r>
-              <a:rPr/>
-              <a:t> </a:t>
-            </a:r>
-            <a:r>
-              <a:rPr/>
-              <a:t>with</a:t>
-            </a:r>
-          </a:p>
-          <a:p>
-            <a:pPr lvl="0" marL="0" indent="0">
-              <a:buNone/>
-            </a:pPr>
-          </a:p>
-          <a:p>
-            <a:pPr lvl="1"/>
-            <a:r>
-              <a:rPr/>
-              <a:t>Part02.</a:t>
-            </a:r>
-            <a:r>
-              <a:rPr/>
-              <a:t> </a:t>
-            </a:r>
-            <a:r>
-              <a:rPr/>
-              <a:t>Label</a:t>
-            </a:r>
-            <a:r>
-              <a:rPr/>
-              <a:t> </a:t>
-            </a:r>
-            <a:r>
-              <a:rPr/>
-              <a:t>your</a:t>
-            </a:r>
-            <a:r>
-              <a:rPr/>
-              <a:t> </a:t>
-            </a:r>
-            <a:r>
-              <a:rPr/>
-              <a:t>categorical</a:t>
-            </a:r>
-            <a:r>
-              <a:rPr/>
-              <a:t> </a:t>
-            </a:r>
-            <a:r>
-              <a:rPr/>
-              <a:t>variables;</a:t>
-            </a:r>
-          </a:p>
-          <a:p>
-            <a:pPr lvl="0" marL="0" indent="0">
-              <a:buNone/>
-            </a:pPr>
-          </a:p>
-          <a:p>
-            <a:pPr lvl="1"/>
-            <a:r>
-              <a:rPr/>
-              <a:t>Notes02.</a:t>
-            </a:r>
-            <a:r>
-              <a:rPr/>
-              <a:t> </a:t>
-            </a:r>
-            <a:r>
-              <a:rPr/>
-              <a:t>There</a:t>
-            </a:r>
-            <a:r>
-              <a:rPr/>
-              <a:t> </a:t>
-            </a:r>
-            <a:r>
-              <a:rPr/>
-              <a:t>are</a:t>
-            </a:r>
-            <a:r>
-              <a:rPr/>
-              <a:t> </a:t>
-            </a:r>
-            <a:r>
-              <a:rPr/>
-              <a:t>several</a:t>
-            </a:r>
-            <a:r>
-              <a:rPr/>
-              <a:t> </a:t>
-            </a:r>
-            <a:r>
-              <a:rPr/>
-              <a:t>categorical</a:t>
-            </a:r>
-          </a:p>
-          <a:p>
-            <a:pPr lvl="0" marL="0" indent="0">
-              <a:buNone/>
-            </a:pPr>
-          </a:p>
-          <a:p>
-            <a:pPr lvl="1"/>
-            <a:r>
-              <a:rPr/>
-              <a:t>Part03.</a:t>
-            </a:r>
-            <a:r>
-              <a:rPr/>
-              <a:t> </a:t>
-            </a:r>
-            <a:r>
-              <a:rPr/>
-              <a:t>Reading</a:t>
-            </a:r>
-            <a:r>
-              <a:rPr/>
-              <a:t> </a:t>
-            </a:r>
-            <a:r>
-              <a:rPr/>
-              <a:t>the</a:t>
-            </a:r>
-            <a:r>
-              <a:rPr/>
-              <a:t> </a:t>
-            </a:r>
-            <a:r>
-              <a:rPr/>
-              <a:t>data</a:t>
-            </a:r>
-            <a:r>
-              <a:rPr/>
-              <a:t> </a:t>
-            </a:r>
-            <a:r>
-              <a:rPr/>
-              <a:t>using</a:t>
-            </a:r>
-            <a:r>
-              <a:rPr/>
-              <a:t> </a:t>
-            </a:r>
-            <a:r>
-              <a:rPr/>
-              <a:t>a</a:t>
-            </a:r>
-            <a:r>
-              <a:rPr/>
-              <a:t> </a:t>
-            </a:r>
-            <a:r>
-              <a:rPr/>
-              <a:t>data</a:t>
-            </a:r>
-            <a:r>
-              <a:rPr/>
-              <a:t> </a:t>
-            </a:r>
-            <a:r>
-              <a:rPr/>
-              <a:t>step;</a:t>
-            </a:r>
-          </a:p>
-          <a:p>
-            <a:pPr lvl="0" marL="0" indent="0">
-              <a:buNone/>
-            </a:pPr>
-          </a:p>
-          <a:p>
-            <a:pPr lvl="1"/>
-            <a:r>
-              <a:rPr/>
-              <a:t>Notes03.</a:t>
-            </a:r>
-            <a:r>
-              <a:rPr/>
-              <a:t> </a:t>
-            </a:r>
-            <a:r>
-              <a:rPr/>
-              <a:t>The</a:t>
-            </a:r>
-            <a:r>
-              <a:rPr/>
-              <a:t> </a:t>
-            </a:r>
-            <a:r>
-              <a:rPr/>
-              <a:t>data</a:t>
-            </a:r>
-            <a:r>
-              <a:rPr/>
-              <a:t> </a:t>
-            </a:r>
-            <a:r>
-              <a:rPr/>
-              <a:t>file</a:t>
-            </a:r>
-            <a:r>
-              <a:rPr/>
-              <a:t> </a:t>
-            </a:r>
-            <a:r>
-              <a:rPr/>
-              <a:t>is</a:t>
-            </a:r>
-            <a:r>
-              <a:rPr/>
-              <a:t> </a:t>
-            </a:r>
-            <a:r>
-              <a:rPr/>
-              <a:t>comma</a:t>
-            </a:r>
-            <a:r>
-              <a:rPr/>
-              <a:t> </a:t>
-            </a:r>
-            <a:r>
-              <a:rPr/>
-              <a:t>delimited</a:t>
-            </a:r>
-            <a:r>
-              <a:rPr/>
-              <a:t> </a:t>
-            </a:r>
-            <a:r>
-              <a:rPr/>
-              <a:t>and</a:t>
-            </a:r>
-          </a:p>
-          <a:p>
-            <a:pPr lvl="0" marL="0" indent="0">
-              <a:buNone/>
-            </a:pPr>
-          </a:p>
-          <a:p>
-            <a:pPr lvl="1"/>
-            <a:r>
-              <a:rPr/>
-              <a:t>Part04.</a:t>
-            </a:r>
-            <a:r>
-              <a:rPr/>
-              <a:t> </a:t>
-            </a:r>
-            <a:r>
-              <a:rPr/>
-              <a:t>Print</a:t>
-            </a:r>
-            <a:r>
-              <a:rPr/>
-              <a:t> </a:t>
-            </a:r>
-            <a:r>
-              <a:rPr/>
-              <a:t>the</a:t>
-            </a:r>
-            <a:r>
-              <a:rPr/>
-              <a:t> </a:t>
-            </a:r>
-            <a:r>
-              <a:rPr/>
-              <a:t>first</a:t>
-            </a:r>
-            <a:r>
-              <a:rPr/>
-              <a:t> </a:t>
-            </a:r>
-            <a:r>
-              <a:rPr/>
-              <a:t>ten</a:t>
-            </a:r>
-            <a:r>
-              <a:rPr/>
-              <a:t> </a:t>
-            </a:r>
-            <a:r>
-              <a:rPr/>
-              <a:t>rows</a:t>
-            </a:r>
-            <a:r>
-              <a:rPr/>
-              <a:t> </a:t>
-            </a:r>
-            <a:r>
-              <a:rPr/>
-              <a:t>of</a:t>
-            </a:r>
-            <a:r>
-              <a:rPr/>
-              <a:t> </a:t>
-            </a:r>
-            <a:r>
-              <a:rPr/>
-              <a:t>data;</a:t>
-            </a:r>
-          </a:p>
-          <a:p>
-            <a:pPr lvl="0" marL="0" indent="0">
-              <a:buNone/>
-            </a:pPr>
-          </a:p>
-          <a:p>
-            <a:pPr lvl="1"/>
-            <a:r>
-              <a:rPr/>
-              <a:t>Notes04.</a:t>
-            </a:r>
-            <a:r>
-              <a:rPr/>
-              <a:t> </a:t>
-            </a:r>
-            <a:r>
-              <a:rPr/>
-              <a:t>It’s</a:t>
-            </a:r>
-            <a:r>
-              <a:rPr/>
-              <a:t> </a:t>
-            </a:r>
-            <a:r>
-              <a:rPr/>
-              <a:t>always</a:t>
-            </a:r>
-            <a:r>
-              <a:rPr/>
-              <a:t> </a:t>
-            </a:r>
-            <a:r>
-              <a:rPr/>
-              <a:t>a</a:t>
-            </a:r>
-            <a:r>
-              <a:rPr/>
-              <a:t> </a:t>
-            </a:r>
-            <a:r>
-              <a:rPr/>
-              <a:t>good</a:t>
-            </a:r>
-            <a:r>
-              <a:rPr/>
-              <a:t> </a:t>
-            </a:r>
-            <a:r>
-              <a:rPr/>
-              <a:t>idea</a:t>
-            </a:r>
-            <a:r>
-              <a:rPr/>
-              <a:t> </a:t>
-            </a:r>
-            <a:r>
-              <a:rPr/>
-              <a:t>to</a:t>
-            </a:r>
-            <a:r>
-              <a:rPr/>
-              <a:t> </a:t>
-            </a:r>
-            <a:r>
-              <a:rPr/>
-              <a:t>peek</a:t>
-            </a:r>
-            <a:r>
-              <a:rPr/>
-              <a:t> </a:t>
-            </a:r>
-            <a:r>
-              <a:rPr/>
-              <a:t>at</a:t>
-            </a:r>
-          </a:p>
-          <a:p>
-            <a:pPr lvl="0" marL="0" indent="0">
-              <a:buNone/>
-            </a:pPr>
-          </a:p>
-          <a:p>
-            <a:pPr lvl="1"/>
-            <a:r>
-              <a:rPr/>
-              <a:t>Part05.</a:t>
-            </a:r>
-            <a:r>
-              <a:rPr/>
-              <a:t> </a:t>
-            </a:r>
-            <a:r>
-              <a:rPr/>
-              <a:t>Proc</a:t>
-            </a:r>
-            <a:r>
-              <a:rPr/>
-              <a:t> </a:t>
-            </a:r>
-            <a:r>
-              <a:rPr/>
-              <a:t>freq</a:t>
-            </a:r>
-            <a:r>
-              <a:rPr/>
-              <a:t> </a:t>
-            </a:r>
-            <a:r>
-              <a:rPr/>
-              <a:t>and</a:t>
-            </a:r>
-            <a:r>
-              <a:rPr/>
-              <a:t> </a:t>
-            </a:r>
-            <a:r>
-              <a:rPr/>
-              <a:t>proc</a:t>
-            </a:r>
-            <a:r>
-              <a:rPr/>
-              <a:t> </a:t>
-            </a:r>
-            <a:r>
-              <a:rPr/>
-              <a:t>means;</a:t>
-            </a:r>
-          </a:p>
-          <a:p>
-            <a:pPr lvl="0" marL="0" indent="0">
-              <a:buNone/>
-            </a:pPr>
-          </a:p>
-          <a:p>
-            <a:pPr lvl="1"/>
-            <a:r>
-              <a:rPr/>
-              <a:t>Notes05.</a:t>
-            </a:r>
-            <a:r>
-              <a:rPr/>
-              <a:t> </a:t>
-            </a:r>
-            <a:r>
-              <a:rPr/>
-              <a:t>There</a:t>
-            </a:r>
-            <a:r>
-              <a:rPr/>
-              <a:t> </a:t>
-            </a:r>
-            <a:r>
-              <a:rPr/>
-              <a:t>is</a:t>
-            </a:r>
-            <a:r>
-              <a:rPr/>
-              <a:t> </a:t>
-            </a:r>
-            <a:r>
-              <a:rPr/>
-              <a:t>a</a:t>
-            </a:r>
-            <a:r>
-              <a:rPr/>
-              <a:t> </a:t>
-            </a:r>
-            <a:r>
-              <a:rPr/>
-              <a:t>mix</a:t>
-            </a:r>
-            <a:r>
-              <a:rPr/>
-              <a:t> </a:t>
-            </a:r>
-            <a:r>
-              <a:rPr/>
-              <a:t>of</a:t>
-            </a:r>
-            <a:r>
-              <a:rPr/>
-              <a:t> </a:t>
-            </a:r>
-            <a:r>
-              <a:rPr/>
-              <a:t>categorical</a:t>
-            </a:r>
-            <a:r>
-              <a:rPr/>
-              <a:t> </a:t>
-            </a:r>
-            <a:r>
-              <a:rPr/>
-              <a:t>and</a:t>
-            </a:r>
-          </a:p>
-          <a:p>
-            <a:pPr lvl="0" marL="0" indent="0">
-              <a:buNone/>
-            </a:pPr>
-          </a:p>
-          <a:p>
-            <a:pPr lvl="1"/>
-            <a:r>
-              <a:rPr/>
-              <a:t>Part06.</a:t>
-            </a:r>
-            <a:r>
-              <a:rPr/>
-              <a:t> </a:t>
-            </a:r>
-            <a:r>
-              <a:rPr/>
-              <a:t>Pearson</a:t>
-            </a:r>
-            <a:r>
-              <a:rPr/>
-              <a:t> </a:t>
-            </a:r>
-            <a:r>
-              <a:rPr/>
-              <a:t>correlation,</a:t>
-            </a:r>
-            <a:r>
-              <a:rPr/>
-              <a:t> </a:t>
-            </a:r>
-            <a:r>
-              <a:rPr/>
-              <a:t>proc</a:t>
-            </a:r>
-            <a:r>
-              <a:rPr/>
-              <a:t> </a:t>
-            </a:r>
-            <a:r>
-              <a:rPr/>
-              <a:t>corr;</a:t>
-            </a:r>
-          </a:p>
-          <a:p>
-            <a:pPr lvl="0" marL="0" indent="0">
-              <a:buNone/>
-            </a:pPr>
-          </a:p>
-          <a:p>
-            <a:pPr lvl="1"/>
-            <a:r>
-              <a:rPr/>
-              <a:t>Notes06.</a:t>
-            </a:r>
-            <a:r>
-              <a:rPr/>
-              <a:t> </a:t>
-            </a:r>
-            <a:r>
-              <a:rPr/>
-              <a:t>The</a:t>
-            </a:r>
-            <a:r>
-              <a:rPr/>
-              <a:t> </a:t>
-            </a:r>
-            <a:r>
-              <a:rPr/>
-              <a:t>Pearson</a:t>
-            </a:r>
-            <a:r>
-              <a:rPr/>
-              <a:t> </a:t>
-            </a:r>
-            <a:r>
-              <a:rPr/>
-              <a:t>correlation</a:t>
-            </a:r>
-            <a:r>
-              <a:rPr/>
-              <a:t> </a:t>
-            </a:r>
-            <a:r>
-              <a:rPr/>
-              <a:t>coefficient</a:t>
-            </a:r>
-          </a:p>
-          <a:p>
-            <a:pPr lvl="0" marL="0" indent="0">
-              <a:buNone/>
-            </a:pPr>
-          </a:p>
-          <a:p>
-            <a:pPr lvl="1"/>
-            <a:r>
-              <a:rPr/>
-              <a:t>Output,</a:t>
-            </a:r>
-            <a:r>
-              <a:rPr/>
-              <a:t> </a:t>
-            </a:r>
-            <a:r>
-              <a:rPr/>
-              <a:t>page</a:t>
-            </a:r>
-            <a:r>
-              <a:rPr/>
-              <a:t> </a:t>
-            </a:r>
-            <a:r>
-              <a:rPr/>
-              <a:t>4.</a:t>
-            </a:r>
-            <a:r>
-              <a:rPr/>
-              <a:t> </a:t>
-            </a:r>
-            <a:r>
-              <a:rPr/>
-              <a:t>Remember</a:t>
-            </a:r>
-            <a:r>
-              <a:rPr/>
-              <a:t> </a:t>
-            </a:r>
-            <a:r>
-              <a:rPr/>
-              <a:t>the</a:t>
-            </a:r>
-            <a:r>
-              <a:rPr/>
-              <a:t> </a:t>
-            </a:r>
-            <a:r>
-              <a:rPr/>
-              <a:t>cut-offs.</a:t>
-            </a:r>
-            <a:r>
-              <a:rPr/>
-              <a:t> </a:t>
-            </a:r>
-            <a:r>
-              <a:rPr/>
-              <a:t>A</a:t>
-            </a:r>
-          </a:p>
-          <a:p>
-            <a:pPr lvl="0" marL="0" indent="0">
-              <a:buNone/>
-            </a:pPr>
-          </a:p>
-          <a:p>
-            <a:pPr lvl="1"/>
-            <a:r>
-              <a:rPr/>
-              <a:t>Part07.</a:t>
-            </a:r>
-            <a:r>
-              <a:rPr/>
-              <a:t> </a:t>
-            </a:r>
-            <a:r>
-              <a:rPr/>
-              <a:t>Scatterplot,</a:t>
-            </a:r>
-            <a:r>
-              <a:rPr/>
-              <a:t> </a:t>
-            </a:r>
-            <a:r>
-              <a:rPr/>
-              <a:t>proc</a:t>
-            </a:r>
-            <a:r>
-              <a:rPr/>
-              <a:t> </a:t>
-            </a:r>
-            <a:r>
-              <a:rPr/>
-              <a:t>sgplot</a:t>
-            </a:r>
-          </a:p>
-          <a:p>
-            <a:pPr lvl="0" marL="0" indent="0">
-              <a:buNone/>
-            </a:pPr>
-          </a:p>
-          <a:p>
-            <a:pPr lvl="1"/>
-            <a:r>
-              <a:rPr/>
-              <a:t>Notes07.</a:t>
-            </a:r>
-            <a:r>
-              <a:rPr/>
-              <a:t> </a:t>
-            </a:r>
-            <a:r>
-              <a:rPr/>
-              <a:t>You</a:t>
-            </a:r>
-            <a:r>
-              <a:rPr/>
-              <a:t> </a:t>
-            </a:r>
-            <a:r>
-              <a:rPr/>
-              <a:t>should</a:t>
-            </a:r>
-            <a:r>
-              <a:rPr/>
-              <a:t> </a:t>
-            </a:r>
-            <a:r>
-              <a:rPr/>
-              <a:t>also</a:t>
-            </a:r>
-            <a:r>
-              <a:rPr/>
-              <a:t> </a:t>
-            </a:r>
-            <a:r>
-              <a:rPr/>
-              <a:t>examine</a:t>
-            </a:r>
-            <a:r>
-              <a:rPr/>
-              <a:t> </a:t>
-            </a:r>
-            <a:r>
-              <a:rPr/>
-              <a:t>the</a:t>
-            </a:r>
-            <a:r>
-              <a:rPr/>
-              <a:t> </a:t>
-            </a:r>
-            <a:r>
-              <a:rPr/>
-              <a:t>association</a:t>
-            </a:r>
-          </a:p>
-          <a:p>
-            <a:pPr lvl="0" marL="0" indent="0">
-              <a:buNone/>
-            </a:pPr>
-          </a:p>
-          <a:p>
-            <a:pPr lvl="1"/>
-            <a:r>
-              <a:rPr/>
-              <a:t>Part08.</a:t>
-            </a:r>
-            <a:r>
-              <a:rPr/>
-              <a:t> </a:t>
-            </a:r>
-            <a:r>
-              <a:rPr/>
-              <a:t>Scatterplot,</a:t>
-            </a:r>
-            <a:r>
-              <a:rPr/>
-              <a:t> </a:t>
-            </a:r>
-            <a:r>
-              <a:rPr/>
-              <a:t>smoothing</a:t>
-            </a:r>
-            <a:r>
-              <a:rPr/>
-              <a:t> </a:t>
-            </a:r>
-            <a:r>
-              <a:rPr/>
-              <a:t>curve</a:t>
-            </a:r>
-          </a:p>
-          <a:p>
-            <a:pPr lvl="0" marL="0" indent="0">
-              <a:buNone/>
-            </a:pPr>
-          </a:p>
-          <a:p>
-            <a:pPr lvl="1"/>
-            <a:r>
-              <a:rPr/>
-              <a:t>Notes08.</a:t>
-            </a:r>
-            <a:r>
-              <a:rPr/>
-              <a:t> </a:t>
-            </a:r>
-            <a:r>
-              <a:rPr/>
-              <a:t>Sometimes</a:t>
-            </a:r>
-            <a:r>
-              <a:rPr/>
-              <a:t> </a:t>
-            </a:r>
-            <a:r>
-              <a:rPr/>
-              <a:t>a</a:t>
-            </a:r>
-            <a:r>
-              <a:rPr/>
-              <a:t> </a:t>
-            </a:r>
-            <a:r>
-              <a:rPr/>
-              <a:t>trend</a:t>
-            </a:r>
-            <a:r>
-              <a:rPr/>
-              <a:t> </a:t>
-            </a:r>
-            <a:r>
-              <a:rPr/>
-              <a:t>line</a:t>
-            </a:r>
-            <a:r>
-              <a:rPr/>
-              <a:t> </a:t>
-            </a:r>
-            <a:r>
-              <a:rPr/>
-              <a:t>can</a:t>
-            </a:r>
-            <a:r>
-              <a:rPr/>
-              <a:t> </a:t>
-            </a:r>
-            <a:r>
-              <a:rPr/>
-              <a:t>help.</a:t>
-            </a:r>
-            <a:r>
-              <a:rPr/>
-              <a:t> </a:t>
-            </a:r>
-            <a:r>
-              <a:rPr/>
-              <a:t>You</a:t>
-            </a:r>
-          </a:p>
-          <a:p>
-            <a:pPr lvl="0" marL="0" indent="0">
-              <a:buNone/>
-            </a:pPr>
-          </a:p>
-          <a:p>
-            <a:pPr lvl="1"/>
-            <a:r>
-              <a:rPr/>
-              <a:t>Part09.</a:t>
-            </a:r>
-            <a:r>
-              <a:rPr/>
-              <a:t> </a:t>
-            </a:r>
-            <a:r>
-              <a:rPr/>
-              <a:t>Boxplot,</a:t>
-            </a:r>
-            <a:r>
-              <a:rPr/>
-              <a:t> </a:t>
-            </a:r>
-            <a:r>
-              <a:rPr/>
-              <a:t>proc</a:t>
-            </a:r>
-            <a:r>
-              <a:rPr/>
-              <a:t> </a:t>
-            </a:r>
-            <a:r>
-              <a:rPr/>
-              <a:t>sgplot</a:t>
-            </a:r>
-          </a:p>
-          <a:p>
-            <a:pPr lvl="0" marL="0" indent="0">
-              <a:buNone/>
-            </a:pPr>
-          </a:p>
-          <a:p>
-            <a:pPr lvl="1"/>
-            <a:r>
-              <a:rPr/>
-              <a:t>Notes09.</a:t>
-            </a:r>
-            <a:r>
-              <a:rPr/>
-              <a:t> </a:t>
-            </a:r>
-            <a:r>
-              <a:rPr/>
-              <a:t>When</a:t>
-            </a:r>
-            <a:r>
-              <a:rPr/>
-              <a:t> </a:t>
-            </a:r>
-            <a:r>
-              <a:rPr/>
-              <a:t>you</a:t>
-            </a:r>
-            <a:r>
-              <a:rPr/>
-              <a:t> </a:t>
-            </a:r>
-            <a:r>
-              <a:rPr/>
-              <a:t>want</a:t>
-            </a:r>
-            <a:r>
-              <a:rPr/>
-              <a:t> </a:t>
-            </a:r>
-            <a:r>
-              <a:rPr/>
-              <a:t>to</a:t>
-            </a:r>
-            <a:r>
-              <a:rPr/>
-              <a:t> </a:t>
-            </a:r>
-            <a:r>
-              <a:rPr/>
-              <a:t>look</a:t>
-            </a:r>
-            <a:r>
-              <a:rPr/>
-              <a:t> </a:t>
-            </a:r>
-            <a:r>
-              <a:rPr/>
-              <a:t>at</a:t>
-            </a:r>
-            <a:r>
-              <a:rPr/>
-              <a:t> </a:t>
-            </a:r>
-            <a:r>
-              <a:rPr/>
-              <a:t>a</a:t>
-            </a:r>
-            <a:r>
-              <a:rPr/>
-              <a:t> </a:t>
-            </a:r>
-            <a:r>
-              <a:rPr/>
-              <a:t>relationship</a:t>
-            </a:r>
-          </a:p>
-          <a:p>
-            <a:pPr lvl="0" marL="0" indent="0">
-              <a:buNone/>
-            </a:pPr>
-          </a:p>
-          <a:p>
-            <a:pPr lvl="1"/>
-            <a:r>
-              <a:rPr/>
-              <a:t>Part10.</a:t>
-            </a:r>
-            <a:r>
-              <a:rPr/>
-              <a:t> </a:t>
-            </a:r>
-            <a:r>
-              <a:rPr/>
-              <a:t>Descriptive</a:t>
-            </a:r>
-            <a:r>
-              <a:rPr/>
-              <a:t> </a:t>
-            </a:r>
-            <a:r>
-              <a:rPr/>
-              <a:t>statistics,</a:t>
-            </a:r>
-            <a:r>
-              <a:rPr/>
-              <a:t> </a:t>
-            </a:r>
-            <a:r>
-              <a:rPr/>
-              <a:t>by</a:t>
-            </a:r>
-            <a:r>
-              <a:rPr/>
-              <a:t> </a:t>
-            </a:r>
-            <a:r>
-              <a:rPr/>
-              <a:t>statement;</a:t>
-            </a:r>
-          </a:p>
-          <a:p>
-            <a:pPr lvl="0" marL="0" indent="0">
-              <a:buNone/>
-            </a:pPr>
-          </a:p>
-          <a:p>
-            <a:pPr lvl="1"/>
-            <a:r>
-              <a:rPr/>
-              <a:t>Notes10.</a:t>
-            </a:r>
-            <a:r>
-              <a:rPr/>
-              <a:t> </a:t>
-            </a:r>
-            <a:r>
-              <a:rPr/>
-              <a:t>Also</a:t>
-            </a:r>
-            <a:r>
-              <a:rPr/>
-              <a:t> </a:t>
-            </a:r>
-            <a:r>
-              <a:rPr/>
-              <a:t>look</a:t>
-            </a:r>
-            <a:r>
-              <a:rPr/>
-              <a:t> </a:t>
-            </a:r>
-            <a:r>
-              <a:rPr/>
-              <a:t>at</a:t>
-            </a:r>
-            <a:r>
-              <a:rPr/>
-              <a:t> </a:t>
-            </a:r>
-            <a:r>
-              <a:rPr/>
-              <a:t>how</a:t>
-            </a:r>
-            <a:r>
-              <a:rPr/>
-              <a:t> </a:t>
-            </a:r>
-            <a:r>
-              <a:rPr/>
-              <a:t>the</a:t>
-            </a:r>
-            <a:r>
-              <a:rPr/>
-              <a:t> </a:t>
-            </a:r>
-            <a:r>
-              <a:rPr/>
-              <a:t>means</a:t>
-            </a:r>
-            <a:r>
-              <a:rPr/>
-              <a:t> </a:t>
-            </a:r>
-            <a:r>
-              <a:rPr/>
-              <a:t>and</a:t>
-            </a:r>
-            <a:r>
-              <a:rPr/>
-              <a:t> </a:t>
-            </a:r>
-            <a:r>
-              <a:rPr/>
-              <a:t>standard</a:t>
-            </a:r>
-          </a:p>
-          <a:p>
-            <a:pPr lvl="0" marL="0" indent="0">
-              <a:buNone/>
-            </a:pPr>
-          </a:p>
-          <a:p>
-            <a:pPr lvl="1"/>
-            <a:r>
-              <a:rPr/>
-              <a:t>Part11.</a:t>
-            </a:r>
-            <a:r>
-              <a:rPr/>
-              <a:t> </a:t>
-            </a:r>
-            <a:r>
-              <a:rPr/>
-              <a:t>Investigate</a:t>
-            </a:r>
-            <a:r>
-              <a:rPr/>
-              <a:t> </a:t>
-            </a:r>
-            <a:r>
-              <a:rPr/>
-              <a:t>unusual</a:t>
-            </a:r>
-            <a:r>
-              <a:rPr/>
-              <a:t> </a:t>
-            </a:r>
-            <a:r>
-              <a:rPr/>
-              <a:t>trend,</a:t>
-            </a:r>
-            <a:r>
-              <a:rPr/>
-              <a:t> </a:t>
-            </a:r>
-            <a:r>
-              <a:rPr/>
-              <a:t>proc</a:t>
-            </a:r>
-            <a:r>
-              <a:rPr/>
-              <a:t> </a:t>
-            </a:r>
-            <a:r>
-              <a:rPr/>
-              <a:t>sgplot</a:t>
-            </a:r>
-            <a:r>
-              <a:rPr/>
-              <a:t> </a:t>
-            </a:r>
-            <a:r>
-              <a:rPr/>
-              <a:t>and</a:t>
-            </a:r>
-            <a:r>
-              <a:rPr/>
-              <a:t> </a:t>
-            </a:r>
-            <a:r>
-              <a:rPr/>
-              <a:t>means;</a:t>
-            </a:r>
-          </a:p>
-          <a:p>
-            <a:pPr lvl="0" marL="0" indent="0">
-              <a:buNone/>
-            </a:pPr>
-          </a:p>
-          <a:p>
-            <a:pPr lvl="1"/>
-            <a:r>
-              <a:rPr/>
-              <a:t>Notes11.</a:t>
-            </a:r>
-            <a:r>
-              <a:rPr/>
-              <a:t> </a:t>
-            </a:r>
-            <a:r>
-              <a:rPr/>
-              <a:t>This</a:t>
-            </a:r>
-            <a:r>
-              <a:rPr/>
-              <a:t> </a:t>
-            </a:r>
-            <a:r>
-              <a:rPr/>
-              <a:t>is</a:t>
-            </a:r>
-            <a:r>
-              <a:rPr/>
-              <a:t> </a:t>
-            </a:r>
-            <a:r>
-              <a:rPr/>
-              <a:t>very</a:t>
-            </a:r>
-            <a:r>
-              <a:rPr/>
-              <a:t> </a:t>
-            </a:r>
-            <a:r>
-              <a:rPr/>
-              <a:t>odd.</a:t>
-            </a:r>
-            <a:r>
-              <a:rPr/>
-              <a:t> </a:t>
-            </a:r>
-            <a:r>
-              <a:rPr/>
-              <a:t>You</a:t>
-            </a:r>
-            <a:r>
-              <a:rPr/>
-              <a:t> </a:t>
-            </a:r>
-            <a:r>
-              <a:rPr/>
-              <a:t>can</a:t>
-            </a:r>
-            <a:r>
-              <a:rPr/>
-              <a:t> </a:t>
-            </a:r>
-            <a:r>
-              <a:rPr/>
-              <a:t>get</a:t>
-            </a:r>
-            <a:r>
-              <a:rPr/>
-              <a:t> </a:t>
-            </a:r>
-            <a:r>
-              <a:rPr/>
-              <a:t>a</a:t>
-            </a:r>
-            <a:r>
-              <a:rPr/>
-              <a:t> </a:t>
-            </a:r>
-            <a:r>
-              <a:rPr/>
-              <a:t>hint</a:t>
-            </a:r>
-            <a:r>
-              <a:rPr/>
-              <a:t> </a:t>
-            </a:r>
-            <a:r>
-              <a:rPr/>
-              <a:t>as</a:t>
-            </a:r>
-          </a:p>
-          <a:p>
-            <a:pPr lvl="0" marL="0" indent="0">
-              <a:buNone/>
-            </a:pPr>
-          </a:p>
-          <a:p>
-            <a:pPr lvl="1"/>
-            <a:r>
-              <a:rPr/>
-              <a:t>Part12.</a:t>
-            </a:r>
-            <a:r>
-              <a:rPr/>
-              <a:t> </a:t>
-            </a:r>
-            <a:r>
-              <a:rPr/>
-              <a:t>End</a:t>
-            </a:r>
-            <a:r>
-              <a:rPr/>
-              <a:t> </a:t>
-            </a:r>
-            <a:r>
-              <a:rPr/>
-              <a:t>of</a:t>
-            </a:r>
-            <a:r>
-              <a:rPr/>
-              <a:t> </a:t>
-            </a:r>
-            <a:r>
-              <a:rPr/>
-              <a:t>program.;</a:t>
-            </a:r>
-          </a:p>
         </p:txBody>
       </p:sp>
       <p:sp>
@@ -2507,7 +873,7 @@
             </a:r>
             <a:r>
               <a:rPr/>
-              <a:t>2.</a:t>
+              <a:t>3.</a:t>
             </a:r>
             <a:r>
               <a:rPr/>
@@ -2531,31 +897,111 @@
             </a:r>
             <a:r>
               <a:rPr/>
-              <a:t>problems.</a:t>
-            </a:r>
-            <a:r>
-              <a:rPr/>
-              <a:t> </a:t>
-            </a:r>
-            <a:r>
-              <a:rPr/>
-              <a:t>This</a:t>
-            </a:r>
-            <a:r>
-              <a:rPr/>
-              <a:t> </a:t>
-            </a:r>
-            <a:r>
-              <a:rPr/>
-              <a:t>could</a:t>
-            </a:r>
-            <a:r>
-              <a:rPr/>
-              <a:t> </a:t>
-            </a:r>
-            <a:r>
-              <a:rPr/>
-              <a:t>mean</a:t>
+              <a:t>minimum</a:t>
+            </a:r>
+            <a:r>
+              <a:rPr/>
+              <a:t> </a:t>
+            </a:r>
+            <a:r>
+              <a:rPr/>
+              <a:t>or</a:t>
+            </a:r>
+            <a:r>
+              <a:rPr/>
+              <a:t> </a:t>
+            </a:r>
+            <a:r>
+              <a:rPr/>
+              <a:t>maximum</a:t>
+            </a:r>
+            <a:r>
+              <a:rPr/>
+              <a:t> </a:t>
+            </a:r>
+            <a:r>
+              <a:rPr/>
+              <a:t>values</a:t>
+            </a:r>
+            <a:r>
+              <a:rPr/>
+              <a:t> </a:t>
+            </a:r>
+            <a:r>
+              <a:rPr/>
+              <a:t>that</a:t>
+            </a:r>
+            <a:r>
+              <a:rPr/>
+              <a:t> </a:t>
+            </a:r>
+            <a:r>
+              <a:rPr/>
+              <a:t>are</a:t>
+            </a:r>
+            <a:r>
+              <a:rPr/>
+              <a:t> </a:t>
+            </a:r>
+            <a:r>
+              <a:rPr/>
+              <a:t>unusual.</a:t>
+            </a:r>
+            <a:r>
+              <a:rPr/>
+              <a:t> </a:t>
+            </a:r>
+            <a:r>
+              <a:rPr/>
+              <a:t>Also</a:t>
+            </a:r>
+            <a:r>
+              <a:rPr/>
+              <a:t> </a:t>
+            </a:r>
+            <a:r>
+              <a:rPr/>
+              <a:t>make</a:t>
+            </a:r>
+            <a:r>
+              <a:rPr/>
+              <a:t> </a:t>
+            </a:r>
+            <a:r>
+              <a:rPr/>
+              <a:t>sure</a:t>
+            </a:r>
+            <a:r>
+              <a:rPr/>
+              <a:t> </a:t>
+            </a:r>
+            <a:r>
+              <a:rPr/>
+              <a:t>that</a:t>
+            </a:r>
+            <a:r>
+              <a:rPr/>
+              <a:t> </a:t>
+            </a:r>
+            <a:r>
+              <a:rPr/>
+              <a:t>you</a:t>
+            </a:r>
+            <a:r>
+              <a:rPr/>
+              <a:t> </a:t>
+            </a:r>
+            <a:r>
+              <a:rPr/>
+              <a:t>don’t</a:t>
+            </a:r>
+            <a:r>
+              <a:rPr/>
+              <a:t> </a:t>
+            </a:r>
+            <a:r>
+              <a:rPr/>
+              <a:t>have</a:t>
             </a:r>
             <a:r>
               <a:rPr/>
@@ -2571,79 +1017,15 @@
             </a:r>
             <a:r>
               <a:rPr/>
-              <a:t>lot</a:t>
-            </a:r>
-            <a:r>
-              <a:rPr/>
-              <a:t> </a:t>
-            </a:r>
-            <a:r>
-              <a:rPr/>
-              <a:t>more</a:t>
-            </a:r>
-            <a:r>
-              <a:rPr/>
-              <a:t> </a:t>
-            </a:r>
-            <a:r>
-              <a:rPr/>
-              <a:t>categories</a:t>
-            </a:r>
-            <a:r>
-              <a:rPr/>
-              <a:t> </a:t>
-            </a:r>
-            <a:r>
-              <a:rPr/>
-              <a:t>than</a:t>
-            </a:r>
-            <a:r>
-              <a:rPr/>
-              <a:t> </a:t>
-            </a:r>
-            <a:r>
-              <a:rPr/>
-              <a:t>you</a:t>
-            </a:r>
-            <a:r>
-              <a:rPr/>
-              <a:t> </a:t>
-            </a:r>
-            <a:r>
-              <a:rPr/>
-              <a:t>expected,</a:t>
-            </a:r>
-            <a:r>
-              <a:rPr/>
-              <a:t> </a:t>
-            </a:r>
-            <a:r>
-              <a:rPr/>
-              <a:t>a</a:t>
-            </a:r>
-            <a:r>
-              <a:rPr/>
-              <a:t> </a:t>
-            </a:r>
-            <a:r>
-              <a:rPr/>
-              <a:t>particular</a:t>
-            </a:r>
-            <a:r>
-              <a:rPr/>
-              <a:t> </a:t>
-            </a:r>
-            <a:r>
-              <a:rPr/>
-              <a:t>category</a:t>
-            </a:r>
-            <a:r>
-              <a:rPr/>
-              <a:t> </a:t>
-            </a:r>
-            <a:r>
-              <a:rPr/>
-              <a:t>level</a:t>
+              <a:t>continuous</a:t>
+            </a:r>
+            <a:r>
+              <a:rPr/>
+              <a:t> </a:t>
+            </a:r>
+            <a:r>
+              <a:rPr/>
+              <a:t>variable</a:t>
             </a:r>
             <a:r>
               <a:rPr/>
@@ -2667,127 +1049,23 @@
             </a:r>
             <a:r>
               <a:rPr/>
-              <a:t>unexpectedly</a:t>
-            </a:r>
-            <a:r>
-              <a:rPr/>
-              <a:t> </a:t>
-            </a:r>
-            <a:r>
-              <a:rPr/>
-              <a:t>small,</a:t>
-            </a:r>
-            <a:r>
-              <a:rPr/>
-              <a:t> </a:t>
-            </a:r>
-            <a:r>
-              <a:rPr/>
-              <a:t>or</a:t>
-            </a:r>
-            <a:r>
-              <a:rPr/>
-              <a:t> </a:t>
-            </a:r>
-            <a:r>
-              <a:rPr/>
-              <a:t>multiple</a:t>
-            </a:r>
-            <a:r>
-              <a:rPr/>
-              <a:t> </a:t>
-            </a:r>
-            <a:r>
-              <a:rPr/>
-              <a:t>categories</a:t>
-            </a:r>
-            <a:r>
-              <a:rPr/>
-              <a:t> </a:t>
-            </a:r>
-            <a:r>
-              <a:rPr/>
-              <a:t>caused</a:t>
-            </a:r>
-            <a:r>
-              <a:rPr/>
-              <a:t> </a:t>
-            </a:r>
-            <a:r>
-              <a:rPr/>
-              <a:t>by</a:t>
-            </a:r>
-            <a:r>
-              <a:rPr/>
-              <a:t> </a:t>
-            </a:r>
-            <a:r>
-              <a:rPr/>
-              <a:t>misspelling</a:t>
-            </a:r>
-            <a:r>
-              <a:rPr/>
-              <a:t> </a:t>
-            </a:r>
-            <a:r>
-              <a:rPr/>
-              <a:t>or</a:t>
-            </a:r>
-            <a:r>
-              <a:rPr/>
-              <a:t> </a:t>
-            </a:r>
-            <a:r>
-              <a:rPr/>
-              <a:t>inconsistent</a:t>
-            </a:r>
-            <a:r>
-              <a:rPr/>
-              <a:t> </a:t>
-            </a:r>
-            <a:r>
-              <a:rPr/>
-              <a:t>capitalization.</a:t>
-            </a:r>
-            <a:r>
-              <a:rPr/>
-              <a:t> </a:t>
-            </a:r>
-            <a:r>
-              <a:rPr/>
-              <a:t>There</a:t>
-            </a:r>
-            <a:r>
-              <a:rPr/>
-              <a:t> </a:t>
-            </a:r>
-            <a:r>
-              <a:rPr/>
-              <a:t>are</a:t>
-            </a:r>
-            <a:r>
-              <a:rPr/>
-              <a:t> </a:t>
-            </a:r>
-            <a:r>
-              <a:rPr/>
-              <a:t>no</a:t>
-            </a:r>
-            <a:r>
-              <a:rPr/>
-              <a:t> </a:t>
-            </a:r>
-            <a:r>
-              <a:rPr/>
-              <a:t>problems</a:t>
-            </a:r>
-            <a:r>
-              <a:rPr/>
-              <a:t> </a:t>
-            </a:r>
-            <a:r>
-              <a:rPr/>
-              <a:t>here.</a:t>
+              <a:t>constant</a:t>
+            </a:r>
+            <a:r>
+              <a:rPr/>
+              <a:t> </a:t>
+            </a:r>
+            <a:r>
+              <a:rPr/>
+              <a:t>(zero</a:t>
+            </a:r>
+            <a:r>
+              <a:rPr/>
+              <a:t> </a:t>
+            </a:r>
+            <a:r>
+              <a:rPr/>
+              <a:t>variation).</a:t>
             </a:r>
           </a:p>
         </p:txBody>
@@ -9313,7 +7591,7 @@
             </a:r>
             <a:r>
               <a:rPr/>
-              <a:t>is</a:t>
+              <a:t>are</a:t>
             </a:r>
             <a:r>
               <a:rPr/>
@@ -13387,7 +11665,15 @@
             </a:r>
             <a:r>
               <a:rPr/>
-              <a:t>output:</a:t>
+              <a:t>Output:</a:t>
+            </a:r>
+            <a:r>
+              <a:rPr/>
+              <a:t> </a:t>
+            </a:r>
+            <a:r>
+              <a:rPr/>
+              <a:t>Part05.</a:t>
             </a:r>
             <a:r>
               <a:rPr/>
@@ -13434,7 +11720,7 @@
       </p:sp>
       <p:pic>
         <p:nvPicPr>
-          <p:cNvPr descr="../images/m05-5507-simon-mix_02.png" id="0" name="Picture 1"/>
+          <p:cNvPr descr="../images/5507-05-simon-working-with-mix-of-variables_02.png" id="0" name="Picture 1"/>
           <p:cNvPicPr>
             <a:picLocks noGrp="1" noChangeAspect="1"/>
           </p:cNvPicPr>
@@ -13495,7 +11781,7 @@
             </a:r>
             <a:r>
               <a:rPr/>
-              <a:t>Output</a:t>
+              <a:t>output</a:t>
             </a:r>
           </a:p>
         </p:txBody>
@@ -13550,7 +11836,15 @@
             </a:r>
             <a:r>
               <a:rPr/>
-              <a:t>output:</a:t>
+              <a:t>Output:</a:t>
+            </a:r>
+            <a:r>
+              <a:rPr/>
+              <a:t> </a:t>
+            </a:r>
+            <a:r>
+              <a:rPr/>
+              <a:t>Part05.</a:t>
             </a:r>
             <a:r>
               <a:rPr/>
@@ -13597,7 +11891,7 @@
       </p:sp>
       <p:pic>
         <p:nvPicPr>
-          <p:cNvPr descr="../images/m05-5507-simon-mix_03.png" id="0" name="Picture 1"/>
+          <p:cNvPr descr="../images/5507-05-simon-working-with-mix-of-variables_03.png" id="0" name="Picture 1"/>
           <p:cNvPicPr>
             <a:picLocks noGrp="1" noChangeAspect="1"/>
           </p:cNvPicPr>
@@ -13658,7 +11952,7 @@
             </a:r>
             <a:r>
               <a:rPr/>
-              <a:t>Output</a:t>
+              <a:t>output</a:t>
             </a:r>
           </a:p>
         </p:txBody>
@@ -13820,6 +12114,14 @@
             </a:r>
             <a:r>
               <a:rPr/>
+              <a:t>Part06.</a:t>
+            </a:r>
+            <a:r>
+              <a:rPr/>
+              <a:t> </a:t>
+            </a:r>
+            <a:r>
+              <a:rPr/>
               <a:t>Pearson</a:t>
             </a:r>
             <a:r>
@@ -13845,10 +12147,6 @@
             <a:r>
               <a:rPr/>
               <a:t>corr</a:t>
-            </a:r>
-            <a:r>
-              <a:rPr/>
-              <a:t> </a:t>
             </a:r>
           </a:p>
         </p:txBody>
@@ -13875,12 +12173,14 @@
               <a:rPr sz="1800">
                 <a:latin typeface="Courier"/>
               </a:rPr>
-              <a:t>title2 "Correlations";
+              <a:t>
+title2 "Correlations";
 proc corr
     nosimple noprob
     data=perm.fev;
   var age fev ht;
-run;</a:t>
+run
+</a:t>
             </a:r>
           </a:p>
         </p:txBody>
@@ -13935,7 +12235,15 @@
             </a:r>
             <a:r>
               <a:rPr/>
-              <a:t>output:</a:t>
+              <a:t>Output:</a:t>
+            </a:r>
+            <a:r>
+              <a:rPr/>
+              <a:t> </a:t>
+            </a:r>
+            <a:r>
+              <a:rPr/>
+              <a:t>Part06.</a:t>
             </a:r>
             <a:r>
               <a:rPr/>
@@ -13974,7 +12282,7 @@
       </p:sp>
       <p:pic>
         <p:nvPicPr>
-          <p:cNvPr descr="../images/m05-5507-simon-mix_04.png" id="0" name="Picture 1"/>
+          <p:cNvPr descr="../images/5507-05-simon-working-with-mix-of-variables_04.png" id="0" name="Picture 1"/>
           <p:cNvPicPr>
             <a:picLocks noGrp="1" noChangeAspect="1"/>
           </p:cNvPicPr>
@@ -14035,7 +12343,7 @@
             </a:r>
             <a:r>
               <a:rPr/>
-              <a:t>Output</a:t>
+              <a:t>output</a:t>
             </a:r>
           </a:p>
         </p:txBody>
@@ -14098,6 +12406,14 @@
             </a:r>
             <a:r>
               <a:rPr/>
+              <a:t>Part07.</a:t>
+            </a:r>
+            <a:r>
+              <a:rPr/>
+              <a:t> </a:t>
+            </a:r>
+            <a:r>
+              <a:rPr/>
               <a:t>Scatterplot,</a:t>
             </a:r>
             <a:r>
@@ -14115,10 +12431,6 @@
             <a:r>
               <a:rPr/>
               <a:t>sgplot</a:t>
-            </a:r>
-            <a:r>
-              <a:rPr/>
-              <a:t> </a:t>
             </a:r>
           </a:p>
         </p:txBody>
@@ -14145,11 +12457,13 @@
               <a:rPr sz="1800">
                 <a:latin typeface="Courier"/>
               </a:rPr>
-              <a:t>title2 "Scatterplots";
+              <a:t>
+title2 "Scatterplots";
 proc sgplot
     data=perm.fev;
   scatter x=ht y=fev;
-run;</a:t>
+run
+</a:t>
             </a:r>
           </a:p>
         </p:txBody>
@@ -14204,7 +12518,15 @@
             </a:r>
             <a:r>
               <a:rPr/>
-              <a:t>output:</a:t>
+              <a:t>Output:</a:t>
+            </a:r>
+            <a:r>
+              <a:rPr/>
+              <a:t> </a:t>
+            </a:r>
+            <a:r>
+              <a:rPr/>
+              <a:t>Part07.</a:t>
             </a:r>
             <a:r>
               <a:rPr/>
@@ -14235,7 +12557,7 @@
       </p:sp>
       <p:pic>
         <p:nvPicPr>
-          <p:cNvPr descr="../images/m05-5507-simon-mix_05.png" id="0" name="Picture 1"/>
+          <p:cNvPr descr="../images/5507-05-simon-working-with-mix-of-variables_05.png" id="0" name="Picture 1"/>
           <p:cNvPicPr>
             <a:picLocks noGrp="1" noChangeAspect="1"/>
           </p:cNvPicPr>
@@ -14296,7 +12618,7 @@
             </a:r>
             <a:r>
               <a:rPr/>
-              <a:t>Output</a:t>
+              <a:t>output</a:t>
             </a:r>
           </a:p>
         </p:txBody>
@@ -14359,6 +12681,14 @@
             </a:r>
             <a:r>
               <a:rPr/>
+              <a:t>Part08.</a:t>
+            </a:r>
+            <a:r>
+              <a:rPr/>
+              <a:t> </a:t>
+            </a:r>
+            <a:r>
+              <a:rPr/>
               <a:t>Scatterplot,</a:t>
             </a:r>
             <a:r>
@@ -14376,10 +12706,6 @@
             <a:r>
               <a:rPr/>
               <a:t>curve</a:t>
-            </a:r>
-            <a:r>
-              <a:rPr/>
-              <a:t> </a:t>
             </a:r>
           </a:p>
         </p:txBody>
@@ -14406,15 +12732,17 @@
               <a:rPr sz="1800">
                 <a:latin typeface="Courier"/>
               </a:rPr>
-              <a:t>title3 "with loess, smooth=0.1";
+              <a:t>
+title3 "with loess, smooth=0.1";
 proc sgplot
     data=perm.fev;
   scatter x=ht y=fev;
-  loess x=ht y=fev / 
-    nomarkers 
+  loess x=ht y=fev /
+    nomarkers
     smooth=0.1
     lineattrs=(color=Red);
-run;</a:t>
+run
+</a:t>
             </a:r>
           </a:p>
         </p:txBody>
@@ -14469,7 +12797,15 @@
             </a:r>
             <a:r>
               <a:rPr/>
-              <a:t>output:</a:t>
+              <a:t>Output:</a:t>
+            </a:r>
+            <a:r>
+              <a:rPr/>
+              <a:t> </a:t>
+            </a:r>
+            <a:r>
+              <a:rPr/>
+              <a:t>Part08.</a:t>
             </a:r>
             <a:r>
               <a:rPr/>
@@ -14500,7 +12836,7 @@
       </p:sp>
       <p:pic>
         <p:nvPicPr>
-          <p:cNvPr descr="../images/m05-5507-simon-mix_06.png" id="0" name="Picture 1"/>
+          <p:cNvPr descr="../images/5507-05-simon-working-with-mix-of-variables_06.png" id="0" name="Picture 1"/>
           <p:cNvPicPr>
             <a:picLocks noGrp="1" noChangeAspect="1"/>
           </p:cNvPicPr>
@@ -14561,7 +12897,7 @@
             </a:r>
             <a:r>
               <a:rPr/>
-              <a:t>Output</a:t>
+              <a:t>output</a:t>
             </a:r>
           </a:p>
         </p:txBody>
@@ -14653,7 +12989,7 @@
             <a:pPr lvl="1"/>
             <a:r>
               <a:rPr/>
-              <a:t>Wht’s next</a:t>
+              <a:t>What’s next</a:t>
             </a:r>
           </a:p>
           <a:p>
@@ -14835,6 +13171,14 @@
             </a:r>
             <a:r>
               <a:rPr/>
+              <a:t>Part09.</a:t>
+            </a:r>
+            <a:r>
+              <a:rPr/>
+              <a:t> </a:t>
+            </a:r>
+            <a:r>
+              <a:rPr/>
               <a:t>Boxplot,</a:t>
             </a:r>
             <a:r>
@@ -14852,10 +13196,6 @@
             <a:r>
               <a:rPr/>
               <a:t>sgplot</a:t>
-            </a:r>
-            <a:r>
-              <a:rPr/>
-              <a:t> </a:t>
             </a:r>
           </a:p>
         </p:txBody>
@@ -14882,12 +13222,14 @@
               <a:rPr sz="1800">
                 <a:latin typeface="Courier"/>
               </a:rPr>
-              <a:t>title2 "Boxplots";
+              <a:t>
+title2 "Boxplots";
 proc sgplot
     data=perm.fev;
   vbox fev / category=smoke;
   format smoke fsmoke.;
-run;</a:t>
+run
+</a:t>
             </a:r>
           </a:p>
         </p:txBody>
@@ -14942,7 +13284,15 @@
             </a:r>
             <a:r>
               <a:rPr/>
-              <a:t>output:</a:t>
+              <a:t>Output:</a:t>
+            </a:r>
+            <a:r>
+              <a:rPr/>
+              <a:t> </a:t>
+            </a:r>
+            <a:r>
+              <a:rPr/>
+              <a:t>Part09.</a:t>
             </a:r>
             <a:r>
               <a:rPr/>
@@ -14973,7 +13323,7 @@
       </p:sp>
       <p:pic>
         <p:nvPicPr>
-          <p:cNvPr descr="../images/m05-5507-simon-mix_07.png" id="0" name="Picture 1"/>
+          <p:cNvPr descr="../images/5507-05-simon-working-with-mix-of-variables_07.png" id="0" name="Picture 1"/>
           <p:cNvPicPr>
             <a:picLocks noGrp="1" noChangeAspect="1"/>
           </p:cNvPicPr>
@@ -15034,7 +13384,7 @@
             </a:r>
             <a:r>
               <a:rPr/>
-              <a:t>Output</a:t>
+              <a:t>output</a:t>
             </a:r>
           </a:p>
         </p:txBody>
@@ -15196,6 +13546,14 @@
             </a:r>
             <a:r>
               <a:rPr/>
+              <a:t>Part10.</a:t>
+            </a:r>
+            <a:r>
+              <a:rPr/>
+              <a:t> </a:t>
+            </a:r>
+            <a:r>
+              <a:rPr/>
               <a:t>Descriptive</a:t>
             </a:r>
             <a:r>
@@ -15221,10 +13579,6 @@
             <a:r>
               <a:rPr/>
               <a:t>statement</a:t>
-            </a:r>
-            <a:r>
-              <a:rPr/>
-              <a:t> </a:t>
             </a:r>
           </a:p>
         </p:txBody>
@@ -15251,7 +13605,8 @@
               <a:rPr sz="1800">
                 <a:latin typeface="Courier"/>
               </a:rPr>
-              <a:t>proc sort
+              <a:t>
+proc sort
     data=perm.fev;
   by smoke;
 run;
@@ -15261,7 +13616,8 @@
   by smoke;
   format smoke fsmoke.;
   title2 "Descriptive statistics by group";
-run;</a:t>
+run
+</a:t>
             </a:r>
           </a:p>
         </p:txBody>
@@ -15316,7 +13672,15 @@
             </a:r>
             <a:r>
               <a:rPr/>
-              <a:t>output:</a:t>
+              <a:t>Output:</a:t>
+            </a:r>
+            <a:r>
+              <a:rPr/>
+              <a:t> </a:t>
+            </a:r>
+            <a:r>
+              <a:rPr/>
+              <a:t>Part10.</a:t>
             </a:r>
             <a:r>
               <a:rPr/>
@@ -15355,7 +13719,7 @@
       </p:sp>
       <p:pic>
         <p:nvPicPr>
-          <p:cNvPr descr="../images/m05-5507-simon-mix_08.png" id="0" name="Picture 1"/>
+          <p:cNvPr descr="../images/5507-05-simon-working-with-mix-of-variables_08.png" id="0" name="Picture 1"/>
           <p:cNvPicPr>
             <a:picLocks noGrp="1" noChangeAspect="1"/>
           </p:cNvPicPr>
@@ -15416,7 +13780,7 @@
             </a:r>
             <a:r>
               <a:rPr/>
-              <a:t>Output</a:t>
+              <a:t>output</a:t>
             </a:r>
           </a:p>
         </p:txBody>
@@ -15578,6 +13942,14 @@
             </a:r>
             <a:r>
               <a:rPr/>
+              <a:t>Part11.</a:t>
+            </a:r>
+            <a:r>
+              <a:rPr/>
+              <a:t> </a:t>
+            </a:r>
+            <a:r>
+              <a:rPr/>
               <a:t>Investigate</a:t>
             </a:r>
             <a:r>
@@ -15627,10 +13999,6 @@
             <a:r>
               <a:rPr/>
               <a:t>means</a:t>
-            </a:r>
-            <a:r>
-              <a:rPr/>
-              <a:t> </a:t>
             </a:r>
           </a:p>
         </p:txBody>
@@ -15657,7 +14025,8 @@
               <a:rPr sz="1800">
                 <a:latin typeface="Courier"/>
               </a:rPr>
-              <a:t>proc sgplot
+              <a:t>
+proc sgplot
     data=perm.fev;
   vbox ht / category=smoke;
   format smoke fsmoke.;
@@ -15674,7 +14043,8 @@
   format smoke fsmoke.;
   title2 "Descriptive statistics by group";
 run;
-ods pdf close;</a:t>
+ods pdf close
+</a:t>
             </a:r>
           </a:p>
         </p:txBody>
@@ -15729,7 +14099,15 @@
             </a:r>
             <a:r>
               <a:rPr/>
-              <a:t>output:</a:t>
+              <a:t>Output:</a:t>
+            </a:r>
+            <a:r>
+              <a:rPr/>
+              <a:t> </a:t>
+            </a:r>
+            <a:r>
+              <a:rPr/>
+              <a:t>Part11.</a:t>
             </a:r>
             <a:r>
               <a:rPr/>
@@ -15792,7 +14170,7 @@
       </p:sp>
       <p:pic>
         <p:nvPicPr>
-          <p:cNvPr descr="../images/m05-5507-simon-mix_09.png" id="0" name="Picture 1"/>
+          <p:cNvPr descr="../images/5507-05-simon-working-with-mix-of-variables_09.png" id="0" name="Picture 1"/>
           <p:cNvPicPr>
             <a:picLocks noGrp="1" noChangeAspect="1"/>
           </p:cNvPicPr>
@@ -15853,7 +14231,7 @@
             </a:r>
             <a:r>
               <a:rPr/>
-              <a:t>Output</a:t>
+              <a:t>output</a:t>
             </a:r>
           </a:p>
         </p:txBody>
@@ -15908,7 +14286,15 @@
             </a:r>
             <a:r>
               <a:rPr/>
-              <a:t>output:</a:t>
+              <a:t>Output:</a:t>
+            </a:r>
+            <a:r>
+              <a:rPr/>
+              <a:t> </a:t>
+            </a:r>
+            <a:r>
+              <a:rPr/>
+              <a:t>Part11.</a:t>
             </a:r>
             <a:r>
               <a:rPr/>
@@ -15971,7 +14357,7 @@
       </p:sp>
       <p:pic>
         <p:nvPicPr>
-          <p:cNvPr descr="../images/m05-5507-simon-mix_10.png" id="0" name="Picture 1"/>
+          <p:cNvPr descr="../images/5507-05-simon-working-with-mix-of-variables_10.png" id="0" name="Picture 1"/>
           <p:cNvPicPr>
             <a:picLocks noGrp="1" noChangeAspect="1"/>
           </p:cNvPicPr>
@@ -16032,7 +14418,7 @@
             </a:r>
             <a:r>
               <a:rPr/>
-              <a:t>Output</a:t>
+              <a:t>output</a:t>
             </a:r>
           </a:p>
         </p:txBody>
@@ -16193,6 +14579,14 @@
             </a:r>
             <a:r>
               <a:rPr/>
+              <a:t>Part00.</a:t>
+            </a:r>
+            <a:r>
+              <a:rPr/>
+              <a:t> </a:t>
+            </a:r>
+            <a:r>
+              <a:rPr/>
               <a:t>Documentation</a:t>
             </a:r>
             <a:r>
@@ -16202,10 +14596,6 @@
             <a:r>
               <a:rPr/>
               <a:t>header</a:t>
-            </a:r>
-            <a:r>
-              <a:rPr/>
-              <a:t> </a:t>
             </a:r>
           </a:p>
         </p:txBody>
@@ -16232,13 +14622,15 @@
               <a:rPr sz="1800">
                 <a:latin typeface="Courier"/>
               </a:rPr>
-              <a:t>5507-05-simon-working-with-a-mix-of-variables.sas
+              <a:t>
+* 5507-05-simon-working-with-a-mix-of-variables.sas
 author: Steve Simon
 date created: 2018-11-27
 purpose: to illustrate how to work with
 data that has a mix of categorical and
 continuous variables.
-license: public domain;</a:t>
+license: public domain
+</a:t>
             </a:r>
           </a:p>
         </p:txBody>
@@ -16301,6 +14693,14 @@
             </a:r>
             <a:r>
               <a:rPr/>
+              <a:t>Part01.</a:t>
+            </a:r>
+            <a:r>
+              <a:rPr/>
+              <a:t> </a:t>
+            </a:r>
+            <a:r>
+              <a:rPr/>
               <a:t>Tell</a:t>
             </a:r>
             <a:r>
@@ -16358,10 +14758,6 @@
             <a:r>
               <a:rPr/>
               <a:t>things.</a:t>
-            </a:r>
-            <a:r>
-              <a:rPr/>
-              <a:t> </a:t>
             </a:r>
           </a:p>
         </p:txBody>
@@ -16388,7 +14784,8 @@
               <a:rPr sz="1800">
                 <a:latin typeface="Courier"/>
               </a:rPr>
-              <a:t>options papersize=(6in 4in); 
+              <a:t>
+options papersize=(6in 4in);
 * This needed to have the output fit on PowerPoint;
 %let path=q:/introduction-to-sas;
 ods pdf
@@ -16396,7 +14793,8 @@
 filename raw_data
   "&amp;path/data/fev.txt";
 libname perm
-  "&amp;path/data";</a:t>
+  "&amp;path/data"
+</a:t>
             </a:r>
           </a:p>
         </p:txBody>
@@ -16459,6 +14857,14 @@
             </a:r>
             <a:r>
               <a:rPr/>
+              <a:t>Part02.</a:t>
+            </a:r>
+            <a:r>
+              <a:rPr/>
+              <a:t> </a:t>
+            </a:r>
+            <a:r>
+              <a:rPr/>
               <a:t>Label</a:t>
             </a:r>
             <a:r>
@@ -16484,10 +14890,6 @@
             <a:r>
               <a:rPr/>
               <a:t>variables</a:t>
-            </a:r>
-            <a:r>
-              <a:rPr/>
-              <a:t> </a:t>
             </a:r>
           </a:p>
         </p:txBody>
@@ -16514,7 +14916,8 @@
               <a:rPr sz="1800">
                 <a:latin typeface="Courier"/>
               </a:rPr>
-              <a:t>proc format;
+              <a:t>
+proc format;
   value fsex
     0 = "Female"
     1 = "Male"
@@ -16523,7 +14926,8 @@
     0 = "Nonsmoker"
     1 = "Smoker"
   ;
-run;</a:t>
+run
+</a:t>
             </a:r>
           </a:p>
         </p:txBody>
@@ -16586,6 +14990,14 @@
             </a:r>
             <a:r>
               <a:rPr/>
+              <a:t>Part03.</a:t>
+            </a:r>
+            <a:r>
+              <a:rPr/>
+              <a:t> </a:t>
+            </a:r>
+            <a:r>
+              <a:rPr/>
               <a:t>Reading</a:t>
             </a:r>
             <a:r>
@@ -16635,10 +15047,6 @@
             <a:r>
               <a:rPr/>
               <a:t>step</a:t>
-            </a:r>
-            <a:r>
-              <a:rPr/>
-              <a:t> </a:t>
             </a:r>
           </a:p>
         </p:txBody>
@@ -16665,7 +15073,8 @@
               <a:rPr sz="1800">
                 <a:latin typeface="Courier"/>
               </a:rPr>
-              <a:t>data perm.fev;
+              <a:t>
+data perm.fev;
   infile raw_data delimiter="," firstobs=2;
   input age fev ht sex smoke;
   label
@@ -16675,7 +15084,8 @@
     sex=Sex
     smoke=Smoking status
   ;
-run;</a:t>
+run
+</a:t>
             </a:r>
           </a:p>
         </p:txBody>
@@ -16738,6 +15148,14 @@
             </a:r>
             <a:r>
               <a:rPr/>
+              <a:t>Part04.</a:t>
+            </a:r>
+            <a:r>
+              <a:rPr/>
+              <a:t> </a:t>
+            </a:r>
+            <a:r>
+              <a:rPr/>
               <a:t>Print</a:t>
             </a:r>
             <a:r>
@@ -16787,10 +15205,6 @@
             <a:r>
               <a:rPr/>
               <a:t>data</a:t>
-            </a:r>
-            <a:r>
-              <a:rPr/>
-              <a:t> </a:t>
             </a:r>
           </a:p>
         </p:txBody>
@@ -16817,15 +15231,17 @@
               <a:rPr sz="1800">
                 <a:latin typeface="Courier"/>
               </a:rPr>
-              <a:t>proc print
+              <a:t>
+proc print
     data=perm.fev(obs=10);
-  format 
-    sex fsex. 
+  format
+    sex fsex.
     smoke fsmoke.
   ;
   title1 "Pulmonary function study";
-  title2 "Partial listing of fev data";
-run;</a:t>
+  title2 "Listing of first ten rows of fev data";
+run
+</a:t>
             </a:r>
           </a:p>
         </p:txBody>
@@ -16880,7 +15296,15 @@
             </a:r>
             <a:r>
               <a:rPr/>
-              <a:t>output:</a:t>
+              <a:t>Output:</a:t>
+            </a:r>
+            <a:r>
+              <a:rPr/>
+              <a:t> </a:t>
+            </a:r>
+            <a:r>
+              <a:rPr/>
+              <a:t>Part04.</a:t>
             </a:r>
             <a:r>
               <a:rPr/>
@@ -16943,7 +15367,7 @@
       </p:sp>
       <p:pic>
         <p:nvPicPr>
-          <p:cNvPr descr="../images/m05-5507-simon-mix_01.png" id="0" name="Picture 1"/>
+          <p:cNvPr descr="../images/5507-05-simon-working-with-mix-of-variables_01.png" id="0" name="Picture 1"/>
           <p:cNvPicPr>
             <a:picLocks noGrp="1" noChangeAspect="1"/>
           </p:cNvPicPr>
@@ -17004,7 +15428,7 @@
             </a:r>
             <a:r>
               <a:rPr/>
-              <a:t>Output</a:t>
+              <a:t>output</a:t>
             </a:r>
           </a:p>
         </p:txBody>
@@ -17067,6 +15491,14 @@
             </a:r>
             <a:r>
               <a:rPr/>
+              <a:t>Part05.</a:t>
+            </a:r>
+            <a:r>
+              <a:rPr/>
+              <a:t> </a:t>
+            </a:r>
+            <a:r>
+              <a:rPr/>
               <a:t>Proc</a:t>
             </a:r>
             <a:r>
@@ -17100,10 +15532,6 @@
             <a:r>
               <a:rPr/>
               <a:t>means</a:t>
-            </a:r>
-            <a:r>
-              <a:rPr/>
-              <a:t> </a:t>
             </a:r>
           </a:p>
         </p:txBody>
@@ -17130,11 +15558,12 @@
               <a:rPr sz="1800">
                 <a:latin typeface="Courier"/>
               </a:rPr>
-              <a:t>proc freq
+              <a:t>
+proc freq
     data=perm.fev;
   tables sex smoke / missing;
-  format 
-    sex fsex. 
+  format
+    sex fsex.
     smoke fsmoke.
   ;
   title2 "Frequency counts";
@@ -17144,7 +15573,8 @@
     data=perm.fev;
   var age fev ht;
   title2 "Descriptive statistics";
-run;</a:t>
+run
+</a:t>
             </a:r>
           </a:p>
         </p:txBody>

</xml_diff>